<commit_message>
working on 2nd season
</commit_message>
<xml_diff>
--- a/support/Proposta de Trabalho.pptx
+++ b/support/Proposta de Trabalho.pptx
@@ -19,6 +19,7 @@
     <p:sldId id="274" r:id="rId13"/>
     <p:sldId id="277" r:id="rId14"/>
     <p:sldId id="263" r:id="rId15"/>
+    <p:sldId id="278" r:id="rId16"/>
   </p:sldIdLst>
   <p:sldSz cx="12192000" cy="6858000"/>
   <p:notesSz cx="6858000" cy="9144000"/>
@@ -117,6 +118,11 @@
       </a:defRPr>
     </a:lvl9pPr>
   </p:defaultTextStyle>
+  <p:extLst>
+    <p:ext uri="{EFAFB233-063F-42B5-8137-9DF3F51BA10A}">
+      <p15:sldGuideLst xmlns:p15="http://schemas.microsoft.com/office/powerpoint/2012/main"/>
+    </p:ext>
+  </p:extLst>
 </p:presentation>
 </file>
 
@@ -269,7 +275,7 @@
           <a:p>
             <a:fld id="{8869195D-221A-4A68-B36F-BB6876F95242}" type="datetimeFigureOut">
               <a:rPr lang="en-GB" smtClean="0"/>
-              <a:t>05/11/2021</a:t>
+              <a:t>06/11/2021</a:t>
             </a:fld>
             <a:endParaRPr lang="en-GB"/>
           </a:p>
@@ -469,7 +475,7 @@
           <a:p>
             <a:fld id="{8869195D-221A-4A68-B36F-BB6876F95242}" type="datetimeFigureOut">
               <a:rPr lang="en-GB" smtClean="0"/>
-              <a:t>05/11/2021</a:t>
+              <a:t>06/11/2021</a:t>
             </a:fld>
             <a:endParaRPr lang="en-GB"/>
           </a:p>
@@ -679,7 +685,7 @@
           <a:p>
             <a:fld id="{8869195D-221A-4A68-B36F-BB6876F95242}" type="datetimeFigureOut">
               <a:rPr lang="en-GB" smtClean="0"/>
-              <a:t>05/11/2021</a:t>
+              <a:t>06/11/2021</a:t>
             </a:fld>
             <a:endParaRPr lang="en-GB"/>
           </a:p>
@@ -879,7 +885,7 @@
           <a:p>
             <a:fld id="{8869195D-221A-4A68-B36F-BB6876F95242}" type="datetimeFigureOut">
               <a:rPr lang="en-GB" smtClean="0"/>
-              <a:t>05/11/2021</a:t>
+              <a:t>06/11/2021</a:t>
             </a:fld>
             <a:endParaRPr lang="en-GB"/>
           </a:p>
@@ -1155,7 +1161,7 @@
           <a:p>
             <a:fld id="{8869195D-221A-4A68-B36F-BB6876F95242}" type="datetimeFigureOut">
               <a:rPr lang="en-GB" smtClean="0"/>
-              <a:t>05/11/2021</a:t>
+              <a:t>06/11/2021</a:t>
             </a:fld>
             <a:endParaRPr lang="en-GB"/>
           </a:p>
@@ -1423,7 +1429,7 @@
           <a:p>
             <a:fld id="{8869195D-221A-4A68-B36F-BB6876F95242}" type="datetimeFigureOut">
               <a:rPr lang="en-GB" smtClean="0"/>
-              <a:t>05/11/2021</a:t>
+              <a:t>06/11/2021</a:t>
             </a:fld>
             <a:endParaRPr lang="en-GB"/>
           </a:p>
@@ -1838,7 +1844,7 @@
           <a:p>
             <a:fld id="{8869195D-221A-4A68-B36F-BB6876F95242}" type="datetimeFigureOut">
               <a:rPr lang="en-GB" smtClean="0"/>
-              <a:t>05/11/2021</a:t>
+              <a:t>06/11/2021</a:t>
             </a:fld>
             <a:endParaRPr lang="en-GB"/>
           </a:p>
@@ -1980,7 +1986,7 @@
           <a:p>
             <a:fld id="{8869195D-221A-4A68-B36F-BB6876F95242}" type="datetimeFigureOut">
               <a:rPr lang="en-GB" smtClean="0"/>
-              <a:t>05/11/2021</a:t>
+              <a:t>06/11/2021</a:t>
             </a:fld>
             <a:endParaRPr lang="en-GB"/>
           </a:p>
@@ -2093,7 +2099,7 @@
           <a:p>
             <a:fld id="{8869195D-221A-4A68-B36F-BB6876F95242}" type="datetimeFigureOut">
               <a:rPr lang="en-GB" smtClean="0"/>
-              <a:t>05/11/2021</a:t>
+              <a:t>06/11/2021</a:t>
             </a:fld>
             <a:endParaRPr lang="en-GB"/>
           </a:p>
@@ -2406,7 +2412,7 @@
           <a:p>
             <a:fld id="{8869195D-221A-4A68-B36F-BB6876F95242}" type="datetimeFigureOut">
               <a:rPr lang="en-GB" smtClean="0"/>
-              <a:t>05/11/2021</a:t>
+              <a:t>06/11/2021</a:t>
             </a:fld>
             <a:endParaRPr lang="en-GB"/>
           </a:p>
@@ -2695,7 +2701,7 @@
           <a:p>
             <a:fld id="{8869195D-221A-4A68-B36F-BB6876F95242}" type="datetimeFigureOut">
               <a:rPr lang="en-GB" smtClean="0"/>
-              <a:t>05/11/2021</a:t>
+              <a:t>06/11/2021</a:t>
             </a:fld>
             <a:endParaRPr lang="en-GB"/>
           </a:p>
@@ -2938,7 +2944,7 @@
           <a:p>
             <a:fld id="{8869195D-221A-4A68-B36F-BB6876F95242}" type="datetimeFigureOut">
               <a:rPr lang="en-GB" smtClean="0"/>
-              <a:t>05/11/2021</a:t>
+              <a:t>06/11/2021</a:t>
             </a:fld>
             <a:endParaRPr lang="en-GB"/>
           </a:p>
@@ -3370,7 +3376,7 @@
         <p:spPr>
           <a:xfrm>
             <a:off x="1361862" y="1105422"/>
-            <a:ext cx="9468297" cy="3416320"/>
+            <a:ext cx="9468298" cy="2585323"/>
           </a:xfrm>
           <a:prstGeom prst="rect">
             <a:avLst/>
@@ -3584,31 +3590,6 @@
                 </a:bgClr>
               </a:pattFill>
             </a:endParaRPr>
-          </a:p>
-          <a:p>
-            <a:pPr algn="r"/>
-            <a:r>
-              <a:rPr lang="en-US" sz="5400" b="1" dirty="0">
-                <a:ln w="12700">
-                  <a:solidFill>
-                    <a:schemeClr val="accent5"/>
-                  </a:solidFill>
-                  <a:prstDash val="solid"/>
-                </a:ln>
-                <a:pattFill prst="ltDnDiag">
-                  <a:fgClr>
-                    <a:schemeClr val="accent5">
-                      <a:lumMod val="60000"/>
-                      <a:lumOff val="40000"/>
-                    </a:schemeClr>
-                  </a:fgClr>
-                  <a:bgClr>
-                    <a:schemeClr val="bg1"/>
-                  </a:bgClr>
-                </a:pattFill>
-              </a:rPr>
-              <a:t>(por André)</a:t>
-            </a:r>
           </a:p>
         </p:txBody>
       </p:sp>
@@ -7700,7 +7681,7 @@
             <a:pPr algn="ctr"/>
             <a:r>
               <a:rPr lang="pt-BR" sz="1600" dirty="0"/>
-              <a:t>?</a:t>
+              <a:t>1</a:t>
             </a:r>
             <a:endParaRPr lang="en-GB" sz="1600" dirty="0"/>
           </a:p>
@@ -9803,6 +9784,55 @@
           </a:fontRef>
         </p:style>
       </p:cxnSp>
+      <p:sp>
+        <p:nvSpPr>
+          <p:cNvPr id="51" name="TextBox 50">
+            <a:extLst>
+              <a:ext uri="{FF2B5EF4-FFF2-40B4-BE49-F238E27FC236}">
+                <a16:creationId xmlns:a16="http://schemas.microsoft.com/office/drawing/2014/main" id="{DA48C5B0-AA2B-411E-AB27-4CE3677177C2}"/>
+              </a:ext>
+            </a:extLst>
+          </p:cNvPr>
+          <p:cNvSpPr txBox="1"/>
+          <p:nvPr/>
+        </p:nvSpPr>
+        <p:spPr>
+          <a:xfrm>
+            <a:off x="60091" y="4044024"/>
+            <a:ext cx="1797631" cy="1015663"/>
+          </a:xfrm>
+          <a:prstGeom prst="rect">
+            <a:avLst/>
+          </a:prstGeom>
+          <a:noFill/>
+        </p:spPr>
+        <p:txBody>
+          <a:bodyPr wrap="square" rtlCol="0">
+            <a:spAutoFit/>
+          </a:bodyPr>
+          <a:lstStyle>
+            <a:defPPr>
+              <a:defRPr lang="en-US"/>
+            </a:defPPr>
+            <a:lvl1pPr>
+              <a:defRPr sz="1200" i="1">
+                <a:solidFill>
+                  <a:schemeClr val="accent6">
+                    <a:lumMod val="75000"/>
+                  </a:schemeClr>
+                </a:solidFill>
+              </a:defRPr>
+            </a:lvl1pPr>
+          </a:lstStyle>
+          <a:p>
+            <a:pPr algn="ctr"/>
+            <a:r>
+              <a:rPr lang="pt-BR" dirty="0"/>
+              <a:t>Continuamos usando regressão linear com variáveis transformadas, da forma empregada para construir a MDRD-4.</a:t>
+            </a:r>
+          </a:p>
+        </p:txBody>
+      </p:sp>
     </p:spTree>
     <p:extLst>
       <p:ext uri="{BB962C8B-B14F-4D97-AF65-F5344CB8AC3E}">
@@ -10163,6 +10193,123 @@
 </p:sld>
 </file>
 
+<file path=ppt/slides/slide15.xml><?xml version="1.0" encoding="utf-8"?>
+<p:sld xmlns:a="http://schemas.openxmlformats.org/drawingml/2006/main" xmlns:r="http://schemas.openxmlformats.org/officeDocument/2006/relationships" xmlns:p="http://schemas.openxmlformats.org/presentationml/2006/main">
+  <p:cSld>
+    <p:spTree>
+      <p:nvGrpSpPr>
+        <p:cNvPr id="1" name=""/>
+        <p:cNvGrpSpPr/>
+        <p:nvPr/>
+      </p:nvGrpSpPr>
+      <p:grpSpPr>
+        <a:xfrm>
+          <a:off x="0" y="0"/>
+          <a:ext cx="0" cy="0"/>
+          <a:chOff x="0" y="0"/>
+          <a:chExt cx="0" cy="0"/>
+        </a:xfrm>
+      </p:grpSpPr>
+      <p:pic>
+        <p:nvPicPr>
+          <p:cNvPr id="5" name="Picture 4">
+            <a:extLst>
+              <a:ext uri="{FF2B5EF4-FFF2-40B4-BE49-F238E27FC236}">
+                <a16:creationId xmlns:a16="http://schemas.microsoft.com/office/drawing/2014/main" id="{232348A8-184D-4C92-ACEF-94CCDA07778E}"/>
+              </a:ext>
+            </a:extLst>
+          </p:cNvPr>
+          <p:cNvPicPr>
+            <a:picLocks noChangeAspect="1"/>
+          </p:cNvPicPr>
+          <p:nvPr/>
+        </p:nvPicPr>
+        <p:blipFill rotWithShape="1">
+          <a:blip r:embed="rId2"/>
+          <a:srcRect l="8742" t="12350" r="12377" b="33115"/>
+          <a:stretch/>
+        </p:blipFill>
+        <p:spPr>
+          <a:xfrm>
+            <a:off x="5919583" y="1274161"/>
+            <a:ext cx="5454569" cy="3161243"/>
+          </a:xfrm>
+          <a:prstGeom prst="rect">
+            <a:avLst/>
+          </a:prstGeom>
+        </p:spPr>
+      </p:pic>
+      <p:pic>
+        <p:nvPicPr>
+          <p:cNvPr id="7" name="Picture 6">
+            <a:extLst>
+              <a:ext uri="{FF2B5EF4-FFF2-40B4-BE49-F238E27FC236}">
+                <a16:creationId xmlns:a16="http://schemas.microsoft.com/office/drawing/2014/main" id="{2861F6D6-CA81-41AC-BD1D-EFC198BB47BD}"/>
+              </a:ext>
+            </a:extLst>
+          </p:cNvPr>
+          <p:cNvPicPr>
+            <a:picLocks noChangeAspect="1"/>
+          </p:cNvPicPr>
+          <p:nvPr/>
+        </p:nvPicPr>
+        <p:blipFill rotWithShape="1">
+          <a:blip r:embed="rId3"/>
+          <a:srcRect t="4481" b="63825"/>
+          <a:stretch/>
+        </p:blipFill>
+        <p:spPr>
+          <a:xfrm>
+            <a:off x="817848" y="3477717"/>
+            <a:ext cx="10556304" cy="2854162"/>
+          </a:xfrm>
+          <a:prstGeom prst="rect">
+            <a:avLst/>
+          </a:prstGeom>
+        </p:spPr>
+      </p:pic>
+      <p:pic>
+        <p:nvPicPr>
+          <p:cNvPr id="9" name="Picture 8">
+            <a:extLst>
+              <a:ext uri="{FF2B5EF4-FFF2-40B4-BE49-F238E27FC236}">
+                <a16:creationId xmlns:a16="http://schemas.microsoft.com/office/drawing/2014/main" id="{FC54E709-9756-4F2D-A9BF-235398FA0A98}"/>
+              </a:ext>
+            </a:extLst>
+          </p:cNvPr>
+          <p:cNvPicPr>
+            <a:picLocks noChangeAspect="1"/>
+          </p:cNvPicPr>
+          <p:nvPr/>
+        </p:nvPicPr>
+        <p:blipFill rotWithShape="1">
+          <a:blip r:embed="rId4"/>
+          <a:srcRect t="7213" b="47323"/>
+          <a:stretch/>
+        </p:blipFill>
+        <p:spPr>
+          <a:xfrm>
+            <a:off x="817848" y="1274161"/>
+            <a:ext cx="5101735" cy="1978702"/>
+          </a:xfrm>
+          <a:prstGeom prst="rect">
+            <a:avLst/>
+          </a:prstGeom>
+        </p:spPr>
+      </p:pic>
+    </p:spTree>
+    <p:extLst>
+      <p:ext uri="{BB962C8B-B14F-4D97-AF65-F5344CB8AC3E}">
+        <p14:creationId xmlns:p14="http://schemas.microsoft.com/office/powerpoint/2010/main" val="3780150632"/>
+      </p:ext>
+    </p:extLst>
+  </p:cSld>
+  <p:clrMapOvr>
+    <a:masterClrMapping/>
+  </p:clrMapOvr>
+</p:sld>
+</file>
+
 <file path=ppt/slides/slide2.xml><?xml version="1.0" encoding="utf-8"?>
 <p:sld xmlns:a="http://schemas.openxmlformats.org/drawingml/2006/main" xmlns:r="http://schemas.openxmlformats.org/officeDocument/2006/relationships" xmlns:p="http://schemas.openxmlformats.org/presentationml/2006/main">
   <p:cSld>
@@ -10308,7 +10455,7 @@
                   <a:srgbClr val="FF0000"/>
                 </a:solidFill>
               </a:rPr>
-              <a:t>Na primeira etapa, a gente aprenderia a metodologia usada para construir uma equação para estimar TFG a partir de dados que nós temos em mãos (ELSA, PNS).</a:t>
+              <a:t>Na primeira etapa, a gente aprenderia como construir uma equação para estimar TFG a partir de dados que nós temos em mãos (ELSA, PNS).</a:t>
             </a:r>
           </a:p>
           <a:p>
@@ -10321,7 +10468,7 @@
                   <a:srgbClr val="FF0000"/>
                 </a:solidFill>
               </a:rPr>
-              <a:t>Na segunda etapa, a gente aprenderia a metodologia usada para construir uma equação para estimar a idade renal a partir de dados que nós temos em mãos.</a:t>
+              <a:t>Na segunda etapa, a gente aprenderia como construir uma equação para estimar a idade renal a partir de dados que nós temos em mãos.</a:t>
             </a:r>
           </a:p>
           <a:p>
@@ -13834,7 +13981,7 @@
                   <a:schemeClr val="accent2"/>
                 </a:solidFill>
               </a:rPr>
-              <a:t>Notebook </a:t>
+              <a:t>Notebook:</a:t>
             </a:r>
           </a:p>
           <a:p>
@@ -14037,7 +14184,7 @@
         <p:spPr>
           <a:xfrm>
             <a:off x="0" y="0"/>
-            <a:ext cx="4064702" cy="646331"/>
+            <a:ext cx="5603458" cy="646331"/>
           </a:xfrm>
           <a:prstGeom prst="rect">
             <a:avLst/>
@@ -14117,6 +14264,50 @@
               </a:rPr>
               <a:t>Temporada</a:t>
             </a:r>
+            <a:r>
+              <a:rPr lang="en-US" sz="3600" b="1" dirty="0">
+                <a:ln w="12700">
+                  <a:solidFill>
+                    <a:schemeClr val="accent5"/>
+                  </a:solidFill>
+                  <a:prstDash val="solid"/>
+                </a:ln>
+                <a:pattFill prst="ltDnDiag">
+                  <a:fgClr>
+                    <a:schemeClr val="accent5">
+                      <a:lumMod val="60000"/>
+                      <a:lumOff val="40000"/>
+                    </a:schemeClr>
+                  </a:fgClr>
+                  <a:bgClr>
+                    <a:schemeClr val="bg1"/>
+                  </a:bgClr>
+                </a:pattFill>
+              </a:rPr>
+              <a:t> - </a:t>
+            </a:r>
+            <a:r>
+              <a:rPr lang="en-US" sz="3600" b="1" dirty="0" err="1">
+                <a:ln w="12700">
+                  <a:solidFill>
+                    <a:schemeClr val="accent5"/>
+                  </a:solidFill>
+                  <a:prstDash val="solid"/>
+                </a:ln>
+                <a:pattFill prst="ltDnDiag">
+                  <a:fgClr>
+                    <a:schemeClr val="accent5">
+                      <a:lumMod val="60000"/>
+                      <a:lumOff val="40000"/>
+                    </a:schemeClr>
+                  </a:fgClr>
+                  <a:bgClr>
+                    <a:schemeClr val="bg1"/>
+                  </a:bgClr>
+                </a:pattFill>
+              </a:rPr>
+              <a:t>Trama</a:t>
+            </a:r>
             <a:endParaRPr lang="en-US" sz="3600" b="1" cap="none" spc="0" dirty="0">
               <a:ln w="12700">
                 <a:solidFill>
@@ -14218,55 +14409,42 @@
           <a:bodyPr wrap="square" rtlCol="0">
             <a:spAutoFit/>
           </a:bodyPr>
-          <a:lstStyle/>
-          <a:p>
-            <a:r>
-              <a:rPr lang="pt-BR" sz="1200" i="1" dirty="0">
+          <a:lstStyle>
+            <a:defPPr>
+              <a:defRPr lang="en-US"/>
+            </a:defPPr>
+            <a:lvl1pPr>
+              <a:defRPr sz="1100" i="1">
                 <a:solidFill>
                   <a:schemeClr val="accent2"/>
                 </a:solidFill>
-              </a:rPr>
+              </a:defRPr>
+            </a:lvl1pPr>
+          </a:lstStyle>
+          <a:p>
+            <a:r>
+              <a:rPr lang="pt-BR" dirty="0"/>
               <a:t>Idade, Sexo, Raça, </a:t>
             </a:r>
             <a:r>
-              <a:rPr lang="pt-BR" sz="1200" i="1" dirty="0" err="1">
-                <a:solidFill>
-                  <a:schemeClr val="accent2"/>
-                </a:solidFill>
-              </a:rPr>
+              <a:rPr lang="pt-BR" dirty="0" err="1"/>
               <a:t>SCr</a:t>
             </a:r>
             <a:r>
-              <a:rPr lang="pt-BR" sz="1200" i="1" dirty="0">
-                <a:solidFill>
-                  <a:schemeClr val="accent2"/>
-                </a:solidFill>
-              </a:rPr>
+              <a:rPr lang="pt-BR" dirty="0"/>
               <a:t>, </a:t>
             </a:r>
           </a:p>
           <a:p>
             <a:r>
-              <a:rPr lang="pt-BR" sz="1200" i="1" dirty="0">
-                <a:solidFill>
-                  <a:schemeClr val="accent2"/>
-                </a:solidFill>
-              </a:rPr>
+              <a:rPr lang="pt-BR" dirty="0"/>
               <a:t>SUN, </a:t>
             </a:r>
             <a:r>
-              <a:rPr lang="pt-BR" sz="1200" i="1" dirty="0" err="1">
-                <a:solidFill>
-                  <a:schemeClr val="accent2"/>
-                </a:solidFill>
-              </a:rPr>
-              <a:t>albumin</a:t>
-            </a:r>
-            <a:endParaRPr lang="pt-BR" sz="1200" i="1" dirty="0">
-              <a:solidFill>
-                <a:schemeClr val="accent2"/>
-              </a:solidFill>
-            </a:endParaRPr>
+              <a:rPr lang="pt-BR" dirty="0" err="1"/>
+              <a:t>Albumin</a:t>
+            </a:r>
+            <a:endParaRPr lang="pt-BR" dirty="0"/>
           </a:p>
         </p:txBody>
       </p:sp>
@@ -14296,29 +14474,28 @@
           <a:bodyPr wrap="square" rtlCol="0">
             <a:spAutoFit/>
           </a:bodyPr>
-          <a:lstStyle/>
-          <a:p>
-            <a:r>
-              <a:rPr lang="pt-BR" sz="1200" i="1" dirty="0">
+          <a:lstStyle>
+            <a:defPPr>
+              <a:defRPr lang="en-US"/>
+            </a:defPPr>
+            <a:lvl1pPr>
+              <a:defRPr sz="1100" i="1">
                 <a:solidFill>
                   <a:schemeClr val="accent2"/>
                 </a:solidFill>
-              </a:rPr>
+              </a:defRPr>
+            </a:lvl1pPr>
+          </a:lstStyle>
+          <a:p>
+            <a:r>
+              <a:rPr lang="pt-BR" dirty="0"/>
               <a:t>Idade, Sexo, Peso, BSA, </a:t>
             </a:r>
             <a:r>
-              <a:rPr lang="pt-BR" sz="1200" i="1" dirty="0" err="1">
-                <a:solidFill>
-                  <a:schemeClr val="accent2"/>
-                </a:solidFill>
-              </a:rPr>
+              <a:rPr lang="pt-BR" dirty="0" err="1"/>
               <a:t>SCr</a:t>
             </a:r>
-            <a:endParaRPr lang="pt-BR" sz="1200" i="1" dirty="0">
-              <a:solidFill>
-                <a:schemeClr val="accent2"/>
-              </a:solidFill>
-            </a:endParaRPr>
+            <a:endParaRPr lang="pt-BR" dirty="0"/>
           </a:p>
         </p:txBody>
       </p:sp>
@@ -14348,14 +14525,21 @@
           <a:bodyPr wrap="square" rtlCol="0">
             <a:spAutoFit/>
           </a:bodyPr>
-          <a:lstStyle/>
-          <a:p>
-            <a:r>
-              <a:rPr lang="pt-BR" sz="1100" i="1" dirty="0">
+          <a:lstStyle>
+            <a:defPPr>
+              <a:defRPr lang="en-US"/>
+            </a:defPPr>
+            <a:lvl1pPr>
+              <a:defRPr sz="1100" i="1">
                 <a:solidFill>
                   <a:schemeClr val="accent2"/>
                 </a:solidFill>
-              </a:rPr>
+              </a:defRPr>
+            </a:lvl1pPr>
+          </a:lstStyle>
+          <a:p>
+            <a:r>
+              <a:rPr lang="pt-BR" dirty="0"/>
               <a:t>MDRD-4, sem transformação</a:t>
             </a:r>
           </a:p>
@@ -14387,15 +14571,22 @@
           <a:bodyPr wrap="square" rtlCol="0">
             <a:spAutoFit/>
           </a:bodyPr>
-          <a:lstStyle/>
-          <a:p>
-            <a:r>
-              <a:rPr lang="pt-BR" sz="1100" i="1" dirty="0">
+          <a:lstStyle>
+            <a:defPPr>
+              <a:defRPr lang="en-US"/>
+            </a:defPPr>
+            <a:lvl1pPr>
+              <a:defRPr sz="1100" i="1">
                 <a:solidFill>
                   <a:schemeClr val="accent2"/>
                 </a:solidFill>
-              </a:rPr>
-              <a:t>MDRD-4, com transformação</a:t>
+              </a:defRPr>
+            </a:lvl1pPr>
+          </a:lstStyle>
+          <a:p>
+            <a:r>
+              <a:rPr lang="pt-BR" dirty="0"/>
+              <a:t>MDRD-4, ‘com transformação</a:t>
             </a:r>
           </a:p>
         </p:txBody>
@@ -14426,30 +14617,29 @@
           <a:bodyPr wrap="square" rtlCol="0">
             <a:spAutoFit/>
           </a:bodyPr>
-          <a:lstStyle/>
-          <a:p>
-            <a:r>
-              <a:rPr lang="pt-BR" sz="1200" i="1" dirty="0">
+          <a:lstStyle>
+            <a:defPPr>
+              <a:defRPr lang="en-US"/>
+            </a:defPPr>
+            <a:lvl1pPr>
+              <a:defRPr sz="1100" i="1">
                 <a:solidFill>
                   <a:schemeClr val="accent2"/>
                 </a:solidFill>
-              </a:rPr>
+              </a:defRPr>
+            </a:lvl1pPr>
+          </a:lstStyle>
+          <a:p>
+            <a:r>
+              <a:rPr lang="pt-BR" dirty="0"/>
               <a:t>Idade, Sexo, Peso, BSA, </a:t>
             </a:r>
             <a:r>
-              <a:rPr lang="pt-BR" sz="1200" i="1" dirty="0" err="1">
-                <a:solidFill>
-                  <a:schemeClr val="accent2"/>
-                </a:solidFill>
-              </a:rPr>
+              <a:rPr lang="pt-BR" dirty="0" err="1"/>
               <a:t>SCr</a:t>
             </a:r>
             <a:r>
-              <a:rPr lang="pt-BR" sz="1200" i="1" dirty="0">
-                <a:solidFill>
-                  <a:schemeClr val="accent2"/>
-                </a:solidFill>
-              </a:rPr>
+              <a:rPr lang="pt-BR" dirty="0"/>
               <a:t>*</a:t>
             </a:r>
           </a:p>
@@ -14503,6 +14693,118 @@
           </a:fontRef>
         </p:style>
       </p:cxnSp>
+      <p:sp>
+        <p:nvSpPr>
+          <p:cNvPr id="52" name="TextBox 51">
+            <a:extLst>
+              <a:ext uri="{FF2B5EF4-FFF2-40B4-BE49-F238E27FC236}">
+                <a16:creationId xmlns:a16="http://schemas.microsoft.com/office/drawing/2014/main" id="{16DB74FC-53F0-41F3-A5A0-A8F7ED8D853E}"/>
+              </a:ext>
+            </a:extLst>
+          </p:cNvPr>
+          <p:cNvSpPr txBox="1"/>
+          <p:nvPr/>
+        </p:nvSpPr>
+        <p:spPr>
+          <a:xfrm>
+            <a:off x="8696499" y="247535"/>
+            <a:ext cx="3448393" cy="830997"/>
+          </a:xfrm>
+          <a:prstGeom prst="rect">
+            <a:avLst/>
+          </a:prstGeom>
+          <a:noFill/>
+        </p:spPr>
+        <p:txBody>
+          <a:bodyPr wrap="square" rtlCol="0">
+            <a:spAutoFit/>
+          </a:bodyPr>
+          <a:lstStyle/>
+          <a:p>
+            <a:r>
+              <a:rPr lang="pt-BR" sz="1200" i="1" dirty="0">
+                <a:solidFill>
+                  <a:schemeClr val="accent2"/>
+                </a:solidFill>
+              </a:rPr>
+              <a:t>Metodologia do estudo:</a:t>
+            </a:r>
+          </a:p>
+          <a:p>
+            <a:pPr marL="171450" indent="-171450">
+              <a:buFontTx/>
+              <a:buChar char="-"/>
+            </a:pPr>
+            <a:r>
+              <a:rPr lang="pt-BR" sz="1200" i="1" dirty="0">
+                <a:solidFill>
+                  <a:schemeClr val="accent2"/>
+                </a:solidFill>
+              </a:rPr>
+              <a:t>Regressão linear com variáveis transformadas</a:t>
+            </a:r>
+          </a:p>
+          <a:p>
+            <a:pPr marL="171450" indent="-171450">
+              <a:buFontTx/>
+              <a:buChar char="-"/>
+            </a:pPr>
+            <a:r>
+              <a:rPr lang="pt-BR" sz="1200" i="1" dirty="0">
+                <a:solidFill>
+                  <a:schemeClr val="accent2"/>
+                </a:solidFill>
+              </a:rPr>
+              <a:t>Critérios de comparação de equações: bias, percentagem bias, </a:t>
+            </a:r>
+            <a:r>
+              <a:rPr lang="pt-BR" sz="1200" i="1" dirty="0" err="1">
+                <a:solidFill>
+                  <a:schemeClr val="accent2"/>
+                </a:solidFill>
+              </a:rPr>
+              <a:t>precision</a:t>
+            </a:r>
+            <a:r>
+              <a:rPr lang="pt-BR" sz="1200" i="1" dirty="0">
+                <a:solidFill>
+                  <a:schemeClr val="accent2"/>
+                </a:solidFill>
+              </a:rPr>
+              <a:t>*, r-</a:t>
+            </a:r>
+            <a:r>
+              <a:rPr lang="pt-BR" sz="1200" i="1" dirty="0" err="1">
+                <a:solidFill>
+                  <a:schemeClr val="accent2"/>
+                </a:solidFill>
+              </a:rPr>
+              <a:t>squared</a:t>
+            </a:r>
+            <a:r>
+              <a:rPr lang="pt-BR" sz="1200" i="1" dirty="0">
+                <a:solidFill>
+                  <a:schemeClr val="accent2"/>
+                </a:solidFill>
+              </a:rPr>
+              <a:t>, </a:t>
+            </a:r>
+            <a:r>
+              <a:rPr lang="pt-BR" sz="1200" i="1" dirty="0" err="1">
+                <a:solidFill>
+                  <a:schemeClr val="accent2"/>
+                </a:solidFill>
+              </a:rPr>
+              <a:t>accuracy</a:t>
+            </a:r>
+            <a:endParaRPr lang="pt-BR" sz="1200" i="1" dirty="0">
+              <a:solidFill>
+                <a:schemeClr val="accent2"/>
+              </a:solidFill>
+            </a:endParaRPr>
+          </a:p>
+        </p:txBody>
+      </p:sp>
     </p:spTree>
     <p:extLst>
       <p:ext uri="{BB962C8B-B14F-4D97-AF65-F5344CB8AC3E}">

</xml_diff>